<commit_message>
minor updates to a couple of slides
</commit_message>
<xml_diff>
--- a/PowerPoints/15 - Strings.pptx
+++ b/PowerPoints/15 - Strings.pptx
@@ -423,8 +423,8 @@
               <a:defRPr/>
             </a:pPr>
             <a:r>
-              <a:rPr lang="en-US"/>
-              <a:t>Arrays</a:t>
+              <a:rPr lang="en-US" dirty="0"/>
+              <a:t>Strings</a:t>
             </a:r>
           </a:p>
         </p:txBody>
@@ -994,7 +994,7 @@
               <a:defRPr/>
             </a:pPr>
             <a:r>
-              <a:rPr lang="en-US"/>
+              <a:rPr lang="en-US" dirty="0"/>
               <a:t>Arrays</a:t>
             </a:r>
           </a:p>
@@ -2514,8 +2514,8 @@
               <a:defRPr/>
             </a:pPr>
             <a:r>
-              <a:rPr lang="en-US"/>
-              <a:t>Arrays</a:t>
+              <a:rPr lang="en-US" dirty="0"/>
+              <a:t>Strings</a:t>
             </a:r>
           </a:p>
         </p:txBody>
@@ -2631,8 +2631,8 @@
               <a:defRPr/>
             </a:pPr>
             <a:r>
-              <a:rPr lang="en-US"/>
-              <a:t>Arrays</a:t>
+              <a:rPr lang="en-US" dirty="0"/>
+              <a:t>Strings</a:t>
             </a:r>
           </a:p>
         </p:txBody>
@@ -2865,7 +2865,7 @@
               <a:defRPr/>
             </a:pPr>
             <a:r>
-              <a:rPr lang="en-US"/>
+              <a:rPr lang="en-US" dirty="0"/>
               <a:t>Arrays</a:t>
             </a:r>
           </a:p>
@@ -2982,7 +2982,7 @@
               <a:defRPr/>
             </a:pPr>
             <a:r>
-              <a:rPr lang="en-US"/>
+              <a:rPr lang="en-US" dirty="0"/>
               <a:t>Arrays</a:t>
             </a:r>
           </a:p>
@@ -3349,8 +3349,16 @@
               <a:defRPr/>
             </a:pPr>
             <a:r>
-              <a:rPr lang="en-US"/>
-              <a:t>©SoftMoore Consulting</a:t>
+              <a:rPr lang="en-US" dirty="0"/>
+              <a:t>©</a:t>
+            </a:r>
+            <a:r>
+              <a:rPr lang="en-US" dirty="0" err="1"/>
+              <a:t>SoftMoore</a:t>
+            </a:r>
+            <a:r>
+              <a:rPr lang="en-US" dirty="0"/>
+              <a:t> Consulting</a:t>
             </a:r>
           </a:p>
         </p:txBody>
@@ -15962,13 +15970,13 @@
           <a:p>
             <a:r>
               <a:rPr lang="en-US" sz="2300" dirty="0"/>
-              <a:t>CPRL uses a variant of name equivalence for array types.</a:t>
+              <a:t>CPRL uses a variant of name equivalence for string types.</a:t>
             </a:r>
           </a:p>
           <a:p>
             <a:r>
               <a:rPr lang="en-US" sz="2300" dirty="0"/>
-              <a:t>String objects in CPRL are considered to have the same type only if they are declared using the same type name or if they are declared with identical array type constructors.  Thus, two distinct string type declarations define different types even if they are structurally identical.</a:t>
+              <a:t>String objects in CPRL are considered to have the same type only if they are declared using the same type name or if they are declared with identical string type constructors.  Thus, two distinct string type declarations define different types even if they are structurally identical.</a:t>
             </a:r>
           </a:p>
           <a:p>
@@ -16375,7 +16383,7 @@
                 <a:latin typeface="Consolas" pitchFamily="49" charset="0"/>
                 <a:cs typeface="Consolas" pitchFamily="49" charset="0"/>
               </a:rPr>
-              <a:t>name1[0] := 'S'          // "Paul" changed to "Saul"</a:t>
+              <a:t>name1[0] := 'S';         // "Paul" changed to "Saul"</a:t>
             </a:r>
           </a:p>
           <a:p>

</xml_diff>

<commit_message>
minor edits to two slides
</commit_message>
<xml_diff>
--- a/PowerPoints/15 - Strings.pptx
+++ b/PowerPoints/15 - Strings.pptx
@@ -1787,12 +1787,10 @@
         </p:nvSpPr>
         <p:spPr/>
         <p:txBody>
-          <a:bodyPr>
-            <a:normAutofit/>
-          </a:bodyPr>
-          <a:lstStyle/>
-          <a:p>
-            <a:endParaRPr lang="en-US"/>
+          <a:bodyPr/>
+          <a:lstStyle/>
+          <a:p>
+            <a:endParaRPr lang="en-US" dirty="0"/>
           </a:p>
         </p:txBody>
       </p:sp>
@@ -1803,7 +1801,7 @@
             <a:spLocks noGrp="1"/>
           </p:cNvSpPr>
           <p:nvPr>
-            <p:ph type="hdr" sz="quarter" idx="10"/>
+            <p:ph type="hdr" sz="quarter"/>
           </p:nvPr>
         </p:nvSpPr>
         <p:spPr/>
@@ -1815,9 +1813,10 @@
               <a:defRPr/>
             </a:pPr>
             <a:r>
-              <a:rPr lang="en-US" dirty="0"/>
+              <a:rPr lang="en-US"/>
               <a:t>Strings</a:t>
             </a:r>
+            <a:endParaRPr lang="en-US" dirty="0"/>
           </a:p>
         </p:txBody>
       </p:sp>
@@ -1828,7 +1827,7 @@
             <a:spLocks noGrp="1"/>
           </p:cNvSpPr>
           <p:nvPr>
-            <p:ph type="sldNum" sz="quarter" idx="11"/>
+            <p:ph type="sldNum" sz="quarter" idx="5"/>
           </p:nvPr>
         </p:nvSpPr>
         <p:spPr/>
@@ -1844,7 +1843,7 @@
               <a:pPr>
                 <a:defRPr/>
               </a:pPr>
-              <a:t>30</a:t>
+              <a:t>24</a:t>
             </a:fld>
             <a:endParaRPr lang="en-US"/>
           </a:p>
@@ -1853,7 +1852,7 @@
     </p:spTree>
     <p:extLst>
       <p:ext uri="{BB962C8B-B14F-4D97-AF65-F5344CB8AC3E}">
-        <p14:creationId xmlns:p14="http://schemas.microsoft.com/office/powerpoint/2010/main" val="2234956356"/>
+        <p14:creationId xmlns:p14="http://schemas.microsoft.com/office/powerpoint/2010/main" val="2742270287"/>
       </p:ext>
     </p:extLst>
   </p:cSld>
@@ -1961,7 +1960,7 @@
               <a:pPr>
                 <a:defRPr/>
               </a:pPr>
-              <a:t>31</a:t>
+              <a:t>30</a:t>
             </a:fld>
             <a:endParaRPr lang="en-US"/>
           </a:p>
@@ -1970,7 +1969,7 @@
     </p:spTree>
     <p:extLst>
       <p:ext uri="{BB962C8B-B14F-4D97-AF65-F5344CB8AC3E}">
-        <p14:creationId xmlns:p14="http://schemas.microsoft.com/office/powerpoint/2010/main" val="3661468207"/>
+        <p14:creationId xmlns:p14="http://schemas.microsoft.com/office/powerpoint/2010/main" val="2234956356"/>
       </p:ext>
     </p:extLst>
   </p:cSld>
@@ -2078,7 +2077,7 @@
               <a:pPr>
                 <a:defRPr/>
               </a:pPr>
-              <a:t>32</a:t>
+              <a:t>31</a:t>
             </a:fld>
             <a:endParaRPr lang="en-US"/>
           </a:p>
@@ -2087,7 +2086,7 @@
     </p:spTree>
     <p:extLst>
       <p:ext uri="{BB962C8B-B14F-4D97-AF65-F5344CB8AC3E}">
-        <p14:creationId xmlns:p14="http://schemas.microsoft.com/office/powerpoint/2010/main" val="1457277834"/>
+        <p14:creationId xmlns:p14="http://schemas.microsoft.com/office/powerpoint/2010/main" val="3661468207"/>
       </p:ext>
     </p:extLst>
   </p:cSld>
@@ -2204,6 +2203,123 @@
     <p:extLst>
       <p:ext uri="{BB962C8B-B14F-4D97-AF65-F5344CB8AC3E}">
         <p14:creationId xmlns:p14="http://schemas.microsoft.com/office/powerpoint/2010/main" val="1795994294"/>
+      </p:ext>
+    </p:extLst>
+  </p:cSld>
+  <p:clrMapOvr>
+    <a:masterClrMapping/>
+  </p:clrMapOvr>
+</p:notes>
+</file>
+
+<file path=ppt/notesSlides/notesSlide20.xml><?xml version="1.0" encoding="utf-8"?>
+<p:notes xmlns:a="http://schemas.openxmlformats.org/drawingml/2006/main" xmlns:r="http://schemas.openxmlformats.org/officeDocument/2006/relationships" xmlns:p="http://schemas.openxmlformats.org/presentationml/2006/main">
+  <p:cSld>
+    <p:spTree>
+      <p:nvGrpSpPr>
+        <p:cNvPr id="1" name=""/>
+        <p:cNvGrpSpPr/>
+        <p:nvPr/>
+      </p:nvGrpSpPr>
+      <p:grpSpPr>
+        <a:xfrm>
+          <a:off x="0" y="0"/>
+          <a:ext cx="0" cy="0"/>
+          <a:chOff x="0" y="0"/>
+          <a:chExt cx="0" cy="0"/>
+        </a:xfrm>
+      </p:grpSpPr>
+      <p:sp>
+        <p:nvSpPr>
+          <p:cNvPr id="2" name="Slide Image Placeholder 1"/>
+          <p:cNvSpPr>
+            <a:spLocks noGrp="1" noRot="1" noChangeAspect="1"/>
+          </p:cNvSpPr>
+          <p:nvPr>
+            <p:ph type="sldImg"/>
+          </p:nvPr>
+        </p:nvSpPr>
+        <p:spPr/>
+      </p:sp>
+      <p:sp>
+        <p:nvSpPr>
+          <p:cNvPr id="3" name="Notes Placeholder 2"/>
+          <p:cNvSpPr>
+            <a:spLocks noGrp="1"/>
+          </p:cNvSpPr>
+          <p:nvPr>
+            <p:ph type="body" idx="1"/>
+          </p:nvPr>
+        </p:nvSpPr>
+        <p:spPr/>
+        <p:txBody>
+          <a:bodyPr>
+            <a:normAutofit/>
+          </a:bodyPr>
+          <a:lstStyle/>
+          <a:p>
+            <a:endParaRPr lang="en-US"/>
+          </a:p>
+        </p:txBody>
+      </p:sp>
+      <p:sp>
+        <p:nvSpPr>
+          <p:cNvPr id="4" name="Header Placeholder 3"/>
+          <p:cNvSpPr>
+            <a:spLocks noGrp="1"/>
+          </p:cNvSpPr>
+          <p:nvPr>
+            <p:ph type="hdr" sz="quarter" idx="10"/>
+          </p:nvPr>
+        </p:nvSpPr>
+        <p:spPr/>
+        <p:txBody>
+          <a:bodyPr/>
+          <a:lstStyle/>
+          <a:p>
+            <a:pPr>
+              <a:defRPr/>
+            </a:pPr>
+            <a:r>
+              <a:rPr lang="en-US" dirty="0"/>
+              <a:t>Strings</a:t>
+            </a:r>
+          </a:p>
+        </p:txBody>
+      </p:sp>
+      <p:sp>
+        <p:nvSpPr>
+          <p:cNvPr id="5" name="Slide Number Placeholder 4"/>
+          <p:cNvSpPr>
+            <a:spLocks noGrp="1"/>
+          </p:cNvSpPr>
+          <p:nvPr>
+            <p:ph type="sldNum" sz="quarter" idx="11"/>
+          </p:nvPr>
+        </p:nvSpPr>
+        <p:spPr/>
+        <p:txBody>
+          <a:bodyPr/>
+          <a:lstStyle/>
+          <a:p>
+            <a:pPr>
+              <a:defRPr/>
+            </a:pPr>
+            <a:fld id="{5BF450E6-15A0-4DB2-99B2-4CCE2B5D6D7D}" type="slidenum">
+              <a:rPr lang="en-US" smtClean="0"/>
+              <a:pPr>
+                <a:defRPr/>
+              </a:pPr>
+              <a:t>32</a:t>
+            </a:fld>
+            <a:endParaRPr lang="en-US"/>
+          </a:p>
+        </p:txBody>
+      </p:sp>
+    </p:spTree>
+    <p:extLst>
+      <p:ext uri="{BB962C8B-B14F-4D97-AF65-F5344CB8AC3E}">
+        <p14:creationId xmlns:p14="http://schemas.microsoft.com/office/powerpoint/2010/main" val="1457277834"/>
       </p:ext>
     </p:extLst>
   </p:cSld>
@@ -12624,12 +12740,20 @@
               <a:t> expects 28 bytes to be on the run-time stack, so the return statement at the end of procedure </a:t>
             </a:r>
             <a:r>
-              <a:rPr lang="en-US" dirty="0" err="1"/>
+              <a:rPr lang="en-US" dirty="0" err="1">
+                <a:latin typeface="Consolas" panose="020B0609020204030204" pitchFamily="49" charset="0"/>
+              </a:rPr>
               <a:t>writeValues</a:t>
             </a:r>
             <a:r>
-              <a:rPr lang="en-US" dirty="0"/>
-              <a:t>() is “</a:t>
+              <a:rPr lang="en-US" dirty="0">
+                <a:latin typeface="Consolas" panose="020B0609020204030204" pitchFamily="49" charset="0"/>
+              </a:rPr>
+              <a:t>()</a:t>
+            </a:r>
+            <a:r>
+              <a:rPr lang="en-US" dirty="0"/>
+              <a:t> is “</a:t>
             </a:r>
             <a:r>
               <a:rPr lang="en-US" dirty="0">
@@ -12815,7 +12939,7 @@
           <a:p>
             <a:r>
               <a:rPr lang="en-US" dirty="0"/>
-              <a:t>We address this problem by introducing the idea of padding, whereby the run-time stack is “padded” to ensure the correct stack size.</a:t>
+              <a:t>We address these problems by introducing the idea of padding, whereby the run-time stack is “padded” to ensure the correct stack size.</a:t>
             </a:r>
           </a:p>
           <a:p>
@@ -13058,6 +13182,110 @@
               <a:t>24</a:t>
             </a:fld>
             <a:endParaRPr lang="en-US"/>
+          </a:p>
+        </p:txBody>
+      </p:sp>
+      <p:sp>
+        <p:nvSpPr>
+          <p:cNvPr id="6" name="Right Brace 5">
+            <a:extLst>
+              <a:ext uri="{FF2B5EF4-FFF2-40B4-BE49-F238E27FC236}">
+                <a16:creationId xmlns:a16="http://schemas.microsoft.com/office/drawing/2014/main" id="{A66237F6-F093-4C4B-E718-562DA69AE608}"/>
+              </a:ext>
+            </a:extLst>
+          </p:cNvPr>
+          <p:cNvSpPr/>
+          <p:nvPr/>
+        </p:nvSpPr>
+        <p:spPr bwMode="auto">
+          <a:xfrm>
+            <a:off x="4693920" y="5001640"/>
+            <a:ext cx="182880" cy="731520"/>
+          </a:xfrm>
+          <a:prstGeom prst="rightBrace">
+            <a:avLst/>
+          </a:prstGeom>
+          <a:noFill/>
+          <a:ln w="9525" cap="flat" cmpd="sng" algn="ctr">
+            <a:solidFill>
+              <a:schemeClr val="tx1"/>
+            </a:solidFill>
+            <a:prstDash val="solid"/>
+            <a:round/>
+            <a:headEnd type="none" w="med" len="med"/>
+            <a:tailEnd type="none" w="med" len="med"/>
+          </a:ln>
+          <a:effectLst/>
+        </p:spPr>
+        <p:txBody>
+          <a:bodyPr vert="horz" wrap="none" lIns="92075" tIns="46038" rIns="92075" bIns="46038" numCol="1" rtlCol="0" anchor="ctr" anchorCtr="0" compatLnSpc="1">
+            <a:prstTxWarp prst="textNoShape">
+              <a:avLst/>
+            </a:prstTxWarp>
+          </a:bodyPr>
+          <a:lstStyle/>
+          <a:p>
+            <a:pPr marL="0" marR="0" indent="0" algn="ctr" defTabSz="914400" rtl="0" eaLnBrk="0" fontAlgn="base" latinLnBrk="0" hangingPunct="0">
+              <a:lnSpc>
+                <a:spcPct val="100000"/>
+              </a:lnSpc>
+              <a:spcBef>
+                <a:spcPct val="0"/>
+              </a:spcBef>
+              <a:spcAft>
+                <a:spcPct val="0"/>
+              </a:spcAft>
+              <a:buClrTx/>
+              <a:buSzTx/>
+              <a:buFontTx/>
+              <a:buNone/>
+              <a:tabLst/>
+            </a:pPr>
+            <a:endParaRPr kumimoji="0" lang="en-US" sz="2400" b="0" i="0" u="none" strike="noStrike" cap="none" normalizeH="0" baseline="0">
+              <a:ln>
+                <a:noFill/>
+              </a:ln>
+              <a:solidFill>
+                <a:schemeClr val="tx1"/>
+              </a:solidFill>
+              <a:effectLst/>
+              <a:latin typeface="Arial" charset="0"/>
+            </a:endParaRPr>
+          </a:p>
+        </p:txBody>
+      </p:sp>
+      <p:sp>
+        <p:nvSpPr>
+          <p:cNvPr id="7" name="TextBox 6">
+            <a:extLst>
+              <a:ext uri="{FF2B5EF4-FFF2-40B4-BE49-F238E27FC236}">
+                <a16:creationId xmlns:a16="http://schemas.microsoft.com/office/drawing/2014/main" id="{C5F882C9-55FE-B9AA-D9B8-8890543F5635}"/>
+              </a:ext>
+            </a:extLst>
+          </p:cNvPr>
+          <p:cNvSpPr txBox="1"/>
+          <p:nvPr/>
+        </p:nvSpPr>
+        <p:spPr>
+          <a:xfrm>
+            <a:off x="4953000" y="5167345"/>
+            <a:ext cx="2693365" cy="400110"/>
+          </a:xfrm>
+          <a:prstGeom prst="rect">
+            <a:avLst/>
+          </a:prstGeom>
+          <a:noFill/>
+        </p:spPr>
+        <p:txBody>
+          <a:bodyPr wrap="none" rtlCol="0">
+            <a:spAutoFit/>
+          </a:bodyPr>
+          <a:lstStyle/>
+          <a:p>
+            <a:r>
+              <a:rPr lang="en-US" sz="2000" dirty="0"/>
+              <a:t>no padding necessary</a:t>
+            </a:r>
           </a:p>
         </p:txBody>
       </p:sp>

</xml_diff>

<commit_message>
updated handout master for set of slides
</commit_message>
<xml_diff>
--- a/PowerPoints/15 - Strings.pptx
+++ b/PowerPoints/15 - Strings.pptx
@@ -323,10 +323,10 @@
               <a:defRPr/>
             </a:pPr>
             <a:r>
-              <a:rPr lang="en-US" sz="1100">
+              <a:rPr lang="en-US" sz="1100" dirty="0">
                 <a:latin typeface="+mn-lt"/>
               </a:rPr>
-              <a:t>14-</a:t>
+              <a:t>15-</a:t>
             </a:r>
             <a:fld id="{5241A4F1-978F-4F0D-82EC-237403889A63}" type="slidenum">
               <a:rPr lang="en-US" sz="1100">
@@ -337,7 +337,7 @@
               </a:pPr>
               <a:t>‹#›</a:t>
             </a:fld>
-            <a:endParaRPr lang="en-US" sz="1100">
+            <a:endParaRPr lang="en-US" sz="1100" dirty="0">
               <a:latin typeface="+mn-lt"/>
             </a:endParaRPr>
           </a:p>

</xml_diff>